<commit_message>
added feedback and tutorial
</commit_message>
<xml_diff>
--- a/Data challenge/WildLifeGuide Presenation.pptx
+++ b/Data challenge/WildLifeGuide Presenation.pptx
@@ -21,7 +21,8 @@
     <p:sldId id="270" r:id="rId15"/>
     <p:sldId id="271" r:id="rId16"/>
     <p:sldId id="272" r:id="rId17"/>
-    <p:sldId id="273" r:id="rId18"/>
+    <p:sldId id="274" r:id="rId18"/>
+    <p:sldId id="273" r:id="rId19"/>
   </p:sldIdLst>
   <p:sldSz cx="12192000" cy="6858000"/>
   <p:notesSz cx="6858000" cy="9144000"/>
@@ -120,6 +121,11 @@
       </a:defRPr>
     </a:lvl9pPr>
   </p:defaultTextStyle>
+  <p:extLst>
+    <p:ext uri="{EFAFB233-063F-42B5-8137-9DF3F51BA10A}">
+      <p15:sldGuideLst xmlns:p15="http://schemas.microsoft.com/office/powerpoint/2012/main"/>
+    </p:ext>
+  </p:extLst>
 </p:presentation>
 </file>
 
@@ -9892,7 +9898,7 @@
           <a:p>
             <a:fld id="{9D0D92BC-42A9-434B-8530-ADBF4485E407}" type="datetimeFigureOut">
               <a:rPr lang="en-US" smtClean="0"/>
-              <a:t>6/7/2023</a:t>
+              <a:t>6/13/2023</a:t>
             </a:fld>
             <a:endParaRPr lang="en-US"/>
           </a:p>
@@ -10143,7 +10149,7 @@
           <a:p>
             <a:fld id="{9D0D92BC-42A9-434B-8530-ADBF4485E407}" type="datetimeFigureOut">
               <a:rPr lang="en-US" smtClean="0"/>
-              <a:t>6/7/2023</a:t>
+              <a:t>6/13/2023</a:t>
             </a:fld>
             <a:endParaRPr lang="en-US"/>
           </a:p>
@@ -10351,7 +10357,7 @@
           <a:p>
             <a:fld id="{9D0D92BC-42A9-434B-8530-ADBF4485E407}" type="datetimeFigureOut">
               <a:rPr lang="en-US" smtClean="0"/>
-              <a:t>6/7/2023</a:t>
+              <a:t>6/13/2023</a:t>
             </a:fld>
             <a:endParaRPr lang="en-US"/>
           </a:p>
@@ -12771,7 +12777,7 @@
           <a:p>
             <a:fld id="{3C04E684-10F4-4CC3-A0B9-F03AA7BE37CF}" type="datetimeFigureOut">
               <a:rPr lang="en-US" smtClean="0"/>
-              <a:t>6/7/2023</a:t>
+              <a:t>6/13/2023</a:t>
             </a:fld>
             <a:endParaRPr lang="en-US"/>
           </a:p>
@@ -13508,7 +13514,7 @@
           <a:p>
             <a:fld id="{3C04E684-10F4-4CC3-A0B9-F03AA7BE37CF}" type="datetimeFigureOut">
               <a:rPr lang="en-US" smtClean="0"/>
-              <a:t>6/7/2023</a:t>
+              <a:t>6/13/2023</a:t>
             </a:fld>
             <a:endParaRPr lang="en-US"/>
           </a:p>
@@ -14150,7 +14156,7 @@
           <a:p>
             <a:fld id="{3C04E684-10F4-4CC3-A0B9-F03AA7BE37CF}" type="datetimeFigureOut">
               <a:rPr lang="en-US" smtClean="0"/>
-              <a:t>6/7/2023</a:t>
+              <a:t>6/13/2023</a:t>
             </a:fld>
             <a:endParaRPr lang="en-US"/>
           </a:p>
@@ -14950,7 +14956,7 @@
           <a:p>
             <a:fld id="{3C04E684-10F4-4CC3-A0B9-F03AA7BE37CF}" type="datetimeFigureOut">
               <a:rPr lang="en-US" smtClean="0"/>
-              <a:t>6/7/2023</a:t>
+              <a:t>6/13/2023</a:t>
             </a:fld>
             <a:endParaRPr lang="en-US"/>
           </a:p>
@@ -15901,7 +15907,7 @@
           <a:p>
             <a:fld id="{3C04E684-10F4-4CC3-A0B9-F03AA7BE37CF}" type="datetimeFigureOut">
               <a:rPr lang="en-US" smtClean="0"/>
-              <a:t>6/7/2023</a:t>
+              <a:t>6/13/2023</a:t>
             </a:fld>
             <a:endParaRPr lang="en-US"/>
           </a:p>
@@ -18250,7 +18256,7 @@
           <a:p>
             <a:fld id="{3C04E684-10F4-4CC3-A0B9-F03AA7BE37CF}" type="datetimeFigureOut">
               <a:rPr lang="en-US" smtClean="0"/>
-              <a:t>6/7/2023</a:t>
+              <a:t>6/13/2023</a:t>
             </a:fld>
             <a:endParaRPr lang="en-US"/>
           </a:p>
@@ -18363,7 +18369,7 @@
           <a:p>
             <a:fld id="{3C04E684-10F4-4CC3-A0B9-F03AA7BE37CF}" type="datetimeFigureOut">
               <a:rPr lang="en-US" smtClean="0"/>
-              <a:t>6/7/2023</a:t>
+              <a:t>6/13/2023</a:t>
             </a:fld>
             <a:endParaRPr lang="en-US"/>
           </a:p>
@@ -18870,7 +18876,7 @@
           <a:p>
             <a:fld id="{3C04E684-10F4-4CC3-A0B9-F03AA7BE37CF}" type="datetimeFigureOut">
               <a:rPr lang="en-US" smtClean="0"/>
-              <a:t>6/7/2023</a:t>
+              <a:t>6/13/2023</a:t>
             </a:fld>
             <a:endParaRPr lang="en-US"/>
           </a:p>
@@ -19068,7 +19074,7 @@
           <a:p>
             <a:fld id="{9D0D92BC-42A9-434B-8530-ADBF4485E407}" type="datetimeFigureOut">
               <a:rPr lang="en-US" smtClean="0"/>
-              <a:t>6/7/2023</a:t>
+              <a:t>6/13/2023</a:t>
             </a:fld>
             <a:endParaRPr lang="en-US"/>
           </a:p>
@@ -20371,7 +20377,7 @@
           <a:p>
             <a:fld id="{3C04E684-10F4-4CC3-A0B9-F03AA7BE37CF}" type="datetimeFigureOut">
               <a:rPr lang="en-US" smtClean="0"/>
-              <a:t>6/7/2023</a:t>
+              <a:t>6/13/2023</a:t>
             </a:fld>
             <a:endParaRPr lang="en-US"/>
           </a:p>
@@ -22865,7 +22871,7 @@
           <a:p>
             <a:fld id="{3C04E684-10F4-4CC3-A0B9-F03AA7BE37CF}" type="datetimeFigureOut">
               <a:rPr lang="en-US" smtClean="0"/>
-              <a:t>6/7/2023</a:t>
+              <a:t>6/13/2023</a:t>
             </a:fld>
             <a:endParaRPr lang="en-US"/>
           </a:p>
@@ -23063,7 +23069,7 @@
           <a:p>
             <a:fld id="{3C04E684-10F4-4CC3-A0B9-F03AA7BE37CF}" type="datetimeFigureOut">
               <a:rPr lang="en-US" smtClean="0"/>
-              <a:t>6/7/2023</a:t>
+              <a:t>6/13/2023</a:t>
             </a:fld>
             <a:endParaRPr lang="en-US"/>
           </a:p>
@@ -23271,7 +23277,7 @@
           <a:p>
             <a:fld id="{3C04E684-10F4-4CC3-A0B9-F03AA7BE37CF}" type="datetimeFigureOut">
               <a:rPr lang="en-US" smtClean="0"/>
-              <a:t>6/7/2023</a:t>
+              <a:t>6/13/2023</a:t>
             </a:fld>
             <a:endParaRPr lang="en-US"/>
           </a:p>
@@ -23551,7 +23557,7 @@
           <a:p>
             <a:fld id="{9D0D92BC-42A9-434B-8530-ADBF4485E407}" type="datetimeFigureOut">
               <a:rPr lang="en-US" smtClean="0"/>
-              <a:t>6/7/2023</a:t>
+              <a:t>6/13/2023</a:t>
             </a:fld>
             <a:endParaRPr lang="en-US"/>
           </a:p>
@@ -23859,7 +23865,7 @@
           <a:p>
             <a:fld id="{9D0D92BC-42A9-434B-8530-ADBF4485E407}" type="datetimeFigureOut">
               <a:rPr lang="en-US" smtClean="0"/>
-              <a:t>6/7/2023</a:t>
+              <a:t>6/13/2023</a:t>
             </a:fld>
             <a:endParaRPr lang="en-US"/>
           </a:p>
@@ -24279,7 +24285,7 @@
           <a:p>
             <a:fld id="{9D0D92BC-42A9-434B-8530-ADBF4485E407}" type="datetimeFigureOut">
               <a:rPr lang="en-US" smtClean="0"/>
-              <a:t>6/7/2023</a:t>
+              <a:t>6/13/2023</a:t>
             </a:fld>
             <a:endParaRPr lang="en-US"/>
           </a:p>
@@ -24511,7 +24517,7 @@
           <a:p>
             <a:fld id="{9D0D92BC-42A9-434B-8530-ADBF4485E407}" type="datetimeFigureOut">
               <a:rPr lang="en-US" smtClean="0"/>
-              <a:t>6/7/2023</a:t>
+              <a:t>6/13/2023</a:t>
             </a:fld>
             <a:endParaRPr lang="en-US"/>
           </a:p>
@@ -24624,7 +24630,7 @@
           <a:p>
             <a:fld id="{9D0D92BC-42A9-434B-8530-ADBF4485E407}" type="datetimeFigureOut">
               <a:rPr lang="en-US" smtClean="0"/>
-              <a:t>6/7/2023</a:t>
+              <a:t>6/13/2023</a:t>
             </a:fld>
             <a:endParaRPr lang="en-US"/>
           </a:p>
@@ -24941,7 +24947,7 @@
           <a:p>
             <a:fld id="{9D0D92BC-42A9-434B-8530-ADBF4485E407}" type="datetimeFigureOut">
               <a:rPr lang="en-US" smtClean="0"/>
-              <a:t>6/7/2023</a:t>
+              <a:t>6/13/2023</a:t>
             </a:fld>
             <a:endParaRPr lang="en-US"/>
           </a:p>
@@ -25233,7 +25239,7 @@
           <a:p>
             <a:fld id="{9D0D92BC-42A9-434B-8530-ADBF4485E407}" type="datetimeFigureOut">
               <a:rPr lang="en-US" smtClean="0"/>
-              <a:t>6/7/2023</a:t>
+              <a:t>6/13/2023</a:t>
             </a:fld>
             <a:endParaRPr lang="en-US"/>
           </a:p>
@@ -25540,7 +25546,7 @@
             <a:fld id="{9D0D92BC-42A9-434B-8530-ADBF4485E407}" type="datetimeFigureOut">
               <a:rPr lang="en-US" smtClean="0"/>
               <a:pPr/>
-              <a:t>6/7/2023</a:t>
+              <a:t>6/13/2023</a:t>
             </a:fld>
             <a:endParaRPr lang="en-US" dirty="0"/>
           </a:p>
@@ -26108,7 +26114,7 @@
           <a:p>
             <a:fld id="{3C04E684-10F4-4CC3-A0B9-F03AA7BE37CF}" type="datetimeFigureOut">
               <a:rPr lang="en-US" smtClean="0"/>
-              <a:t>6/7/2023</a:t>
+              <a:t>6/13/2023</a:t>
             </a:fld>
             <a:endParaRPr lang="en-US"/>
           </a:p>
@@ -27837,23 +27843,25 @@
           <a:p>
             <a:r>
               <a:rPr lang="nl-NL" dirty="0"/>
-              <a:t>Fine-</a:t>
+              <a:t>Remove rows with observation &lt; 50</a:t>
             </a:r>
-            <a:r>
-              <a:rPr lang="nl-NL" dirty="0" err="1"/>
-              <a:t>tuning</a:t>
-            </a:r>
+          </a:p>
+          <a:p>
             <a:r>
               <a:rPr lang="nl-NL" dirty="0"/>
-              <a:t> </a:t>
+              <a:t>Data Augumentation (random transformation)</a:t>
             </a:r>
-            <a:r>
-              <a:rPr lang="nl-NL" dirty="0" err="1"/>
-              <a:t>the</a:t>
-            </a:r>
+          </a:p>
+          <a:p>
             <a:r>
               <a:rPr lang="nl-NL" dirty="0"/>
-              <a:t> model</a:t>
+              <a:t>Learning rate</a:t>
+            </a:r>
+          </a:p>
+          <a:p>
+            <a:r>
+              <a:rPr lang="nl-NL" dirty="0"/>
+              <a:t>Fine-tuning the model</a:t>
             </a:r>
           </a:p>
           <a:p>
@@ -28159,31 +28167,7 @@
           <a:p>
             <a:r>
               <a:rPr lang="nl-NL" dirty="0"/>
-              <a:t>Model has </a:t>
-            </a:r>
-            <a:r>
-              <a:rPr lang="nl-NL" dirty="0" err="1"/>
-              <a:t>learned</a:t>
-            </a:r>
-            <a:r>
-              <a:rPr lang="nl-NL" dirty="0"/>
-              <a:t> </a:t>
-            </a:r>
-            <a:r>
-              <a:rPr lang="nl-NL" dirty="0" err="1"/>
-              <a:t>the</a:t>
-            </a:r>
-            <a:r>
-              <a:rPr lang="nl-NL" dirty="0"/>
-              <a:t> training data </a:t>
-            </a:r>
-            <a:r>
-              <a:rPr lang="nl-NL" dirty="0" err="1"/>
-              <a:t>to</a:t>
-            </a:r>
-            <a:r>
-              <a:rPr lang="nl-NL" dirty="0"/>
-              <a:t> well</a:t>
+              <a:t>Model has learned the training data too well</a:t>
             </a:r>
           </a:p>
           <a:p>
@@ -29339,52 +29323,14 @@
           </a:p>
           <a:p>
             <a:r>
-              <a:rPr lang="nl-NL" dirty="0" err="1"/>
-              <a:t>Problem</a:t>
+              <a:rPr lang="nl-NL" dirty="0"/>
+              <a:t>Problem is probably in the dataset (not enough observations)</a:t>
             </a:r>
+          </a:p>
+          <a:p>
             <a:r>
               <a:rPr lang="nl-NL" dirty="0"/>
-              <a:t> is </a:t>
-            </a:r>
-            <a:r>
-              <a:rPr lang="nl-NL" dirty="0" err="1"/>
-              <a:t>probably</a:t>
-            </a:r>
-            <a:r>
-              <a:rPr lang="nl-NL" dirty="0"/>
-              <a:t> in </a:t>
-            </a:r>
-            <a:r>
-              <a:rPr lang="nl-NL" dirty="0" err="1"/>
-              <a:t>the</a:t>
-            </a:r>
-            <a:r>
-              <a:rPr lang="nl-NL" dirty="0"/>
-              <a:t> dataset (</a:t>
-            </a:r>
-            <a:r>
-              <a:rPr lang="nl-NL" dirty="0" err="1"/>
-              <a:t>not</a:t>
-            </a:r>
-            <a:r>
-              <a:rPr lang="nl-NL" dirty="0"/>
-              <a:t> </a:t>
-            </a:r>
-            <a:r>
-              <a:rPr lang="nl-NL" dirty="0" err="1"/>
-              <a:t>enough</a:t>
-            </a:r>
-            <a:r>
-              <a:rPr lang="nl-NL" dirty="0"/>
-              <a:t> </a:t>
-            </a:r>
-            <a:r>
-              <a:rPr lang="nl-NL" dirty="0" err="1"/>
-              <a:t>observations</a:t>
-            </a:r>
-            <a:r>
-              <a:rPr lang="nl-NL" dirty="0"/>
-              <a:t>)</a:t>
+              <a:t>CPU?</a:t>
             </a:r>
           </a:p>
           <a:p>
@@ -29461,6 +29407,382 @@
 </file>
 
 <file path=ppt/slides/slide16.xml><?xml version="1.0" encoding="utf-8"?>
+<p:sld xmlns:a="http://schemas.openxmlformats.org/drawingml/2006/main" xmlns:r="http://schemas.openxmlformats.org/officeDocument/2006/relationships" xmlns:p="http://schemas.openxmlformats.org/presentationml/2006/main">
+  <p:cSld>
+    <p:bg>
+      <p:bgPr>
+        <a:solidFill>
+          <a:schemeClr val="bg1"/>
+        </a:solidFill>
+        <a:effectLst/>
+      </p:bgPr>
+    </p:bg>
+    <p:spTree>
+      <p:nvGrpSpPr>
+        <p:cNvPr id="1" name=""/>
+        <p:cNvGrpSpPr/>
+        <p:nvPr/>
+      </p:nvGrpSpPr>
+      <p:grpSpPr>
+        <a:xfrm>
+          <a:off x="0" y="0"/>
+          <a:ext cx="0" cy="0"/>
+          <a:chOff x="0" y="0"/>
+          <a:chExt cx="0" cy="0"/>
+        </a:xfrm>
+      </p:grpSpPr>
+      <p:sp useBgFill="1">
+        <p:nvSpPr>
+          <p:cNvPr id="102" name="Rectangle 91">
+            <a:extLst>
+              <a:ext uri="{FF2B5EF4-FFF2-40B4-BE49-F238E27FC236}">
+                <a16:creationId xmlns:a16="http://schemas.microsoft.com/office/drawing/2014/main" id="{5669F72C-E3FB-4C48-AEBD-AF7AC0D749C7}"/>
+              </a:ext>
+              <a:ext uri="{C183D7F6-B498-43B3-948B-1728B52AA6E4}">
+                <adec:decorative xmlns:adec="http://schemas.microsoft.com/office/drawing/2017/decorative" val="1"/>
+              </a:ext>
+            </a:extLst>
+          </p:cNvPr>
+          <p:cNvSpPr>
+            <a:spLocks noGrp="1" noRot="1" noChangeAspect="1" noMove="1" noResize="1" noEditPoints="1" noAdjustHandles="1" noChangeArrowheads="1" noChangeShapeType="1" noTextEdit="1"/>
+          </p:cNvSpPr>
+          <p:nvPr>
+            <p:extLst>
+              <p:ext uri="{386F3935-93C4-4BCD-93E2-E3B085C9AB24}">
+                <p16:designElem xmlns:p16="http://schemas.microsoft.com/office/powerpoint/2015/main" val="1"/>
+              </p:ext>
+            </p:extLst>
+          </p:nvPr>
+        </p:nvSpPr>
+        <p:spPr>
+          <a:xfrm>
+            <a:off x="0" y="0"/>
+            <a:ext cx="12192000" cy="6858000"/>
+          </a:xfrm>
+          <a:prstGeom prst="rect">
+            <a:avLst/>
+          </a:prstGeom>
+          <a:ln w="12700" cap="flat" cmpd="sng" algn="ctr">
+            <a:noFill/>
+            <a:prstDash val="solid"/>
+            <a:miter lim="800000"/>
+          </a:ln>
+          <a:effectLst/>
+          <a:extLst>
+            <a:ext uri="{91240B29-F687-4F45-9708-019B960494DF}">
+              <a14:hiddenLine xmlns:a14="http://schemas.microsoft.com/office/drawing/2010/main" w="12700" cap="flat" cmpd="sng" algn="ctr">
+                <a:solidFill>
+                  <a:schemeClr val="accent1">
+                    <a:shade val="50000"/>
+                  </a:schemeClr>
+                </a:solidFill>
+                <a:prstDash val="solid"/>
+                <a:miter lim="800000"/>
+              </a14:hiddenLine>
+            </a:ext>
+          </a:extLst>
+        </p:spPr>
+        <p:style>
+          <a:lnRef idx="2">
+            <a:schemeClr val="accent1">
+              <a:shade val="50000"/>
+            </a:schemeClr>
+          </a:lnRef>
+          <a:fillRef idx="1">
+            <a:schemeClr val="accent1"/>
+          </a:fillRef>
+          <a:effectRef idx="0">
+            <a:schemeClr val="accent1"/>
+          </a:effectRef>
+          <a:fontRef idx="minor">
+            <a:schemeClr val="lt1"/>
+          </a:fontRef>
+        </p:style>
+        <p:txBody>
+          <a:bodyPr rtlCol="0" anchor="ctr"/>
+          <a:lstStyle/>
+          <a:p>
+            <a:pPr algn="ctr"/>
+            <a:endParaRPr lang="en-US"/>
+          </a:p>
+        </p:txBody>
+      </p:sp>
+      <p:sp>
+        <p:nvSpPr>
+          <p:cNvPr id="103" name="Freeform: Shape 93">
+            <a:extLst>
+              <a:ext uri="{FF2B5EF4-FFF2-40B4-BE49-F238E27FC236}">
+                <a16:creationId xmlns:a16="http://schemas.microsoft.com/office/drawing/2014/main" id="{2F9995FB-469D-2E41-1BFB-41F15A2FF8DD}"/>
+              </a:ext>
+              <a:ext uri="{C183D7F6-B498-43B3-948B-1728B52AA6E4}">
+                <adec:decorative xmlns:adec="http://schemas.microsoft.com/office/drawing/2017/decorative" val="1"/>
+              </a:ext>
+            </a:extLst>
+          </p:cNvPr>
+          <p:cNvSpPr>
+            <a:spLocks noGrp="1" noRot="1" noChangeAspect="1" noMove="1" noResize="1" noEditPoints="1" noAdjustHandles="1" noChangeArrowheads="1" noChangeShapeType="1" noTextEdit="1"/>
+          </p:cNvSpPr>
+          <p:nvPr>
+            <p:extLst>
+              <p:ext uri="{386F3935-93C4-4BCD-93E2-E3B085C9AB24}">
+                <p16:designElem xmlns:p16="http://schemas.microsoft.com/office/powerpoint/2015/main" val="1"/>
+              </p:ext>
+            </p:extLst>
+          </p:nvPr>
+        </p:nvSpPr>
+        <p:spPr>
+          <a:xfrm>
+            <a:off x="869342" y="1250342"/>
+            <a:ext cx="4357316" cy="4357316"/>
+          </a:xfrm>
+          <a:custGeom>
+            <a:avLst/>
+            <a:gdLst>
+              <a:gd name="connsiteX0" fmla="*/ 2178658 w 4357316"/>
+              <a:gd name="connsiteY0" fmla="*/ 0 h 4357316"/>
+              <a:gd name="connsiteX1" fmla="*/ 4357316 w 4357316"/>
+              <a:gd name="connsiteY1" fmla="*/ 2178658 h 4357316"/>
+              <a:gd name="connsiteX2" fmla="*/ 2178658 w 4357316"/>
+              <a:gd name="connsiteY2" fmla="*/ 4357316 h 4357316"/>
+              <a:gd name="connsiteX3" fmla="*/ 0 w 4357316"/>
+              <a:gd name="connsiteY3" fmla="*/ 2178658 h 4357316"/>
+              <a:gd name="connsiteX4" fmla="*/ 2178658 w 4357316"/>
+              <a:gd name="connsiteY4" fmla="*/ 0 h 4357316"/>
+            </a:gdLst>
+            <a:ahLst/>
+            <a:cxnLst>
+              <a:cxn ang="0">
+                <a:pos x="connsiteX0" y="connsiteY0"/>
+              </a:cxn>
+              <a:cxn ang="0">
+                <a:pos x="connsiteX1" y="connsiteY1"/>
+              </a:cxn>
+              <a:cxn ang="0">
+                <a:pos x="connsiteX2" y="connsiteY2"/>
+              </a:cxn>
+              <a:cxn ang="0">
+                <a:pos x="connsiteX3" y="connsiteY3"/>
+              </a:cxn>
+              <a:cxn ang="0">
+                <a:pos x="connsiteX4" y="connsiteY4"/>
+              </a:cxn>
+            </a:cxnLst>
+            <a:rect l="l" t="t" r="r" b="b"/>
+            <a:pathLst>
+              <a:path w="4357316" h="4357316">
+                <a:moveTo>
+                  <a:pt x="2178658" y="0"/>
+                </a:moveTo>
+                <a:cubicBezTo>
+                  <a:pt x="3381898" y="0"/>
+                  <a:pt x="4357316" y="975418"/>
+                  <a:pt x="4357316" y="2178658"/>
+                </a:cubicBezTo>
+                <a:cubicBezTo>
+                  <a:pt x="4357316" y="3381898"/>
+                  <a:pt x="3381898" y="4357316"/>
+                  <a:pt x="2178658" y="4357316"/>
+                </a:cubicBezTo>
+                <a:cubicBezTo>
+                  <a:pt x="975418" y="4357316"/>
+                  <a:pt x="0" y="3381898"/>
+                  <a:pt x="0" y="2178658"/>
+                </a:cubicBezTo>
+                <a:cubicBezTo>
+                  <a:pt x="0" y="975418"/>
+                  <a:pt x="975418" y="0"/>
+                  <a:pt x="2178658" y="0"/>
+                </a:cubicBezTo>
+                <a:close/>
+              </a:path>
+            </a:pathLst>
+          </a:custGeom>
+          <a:gradFill>
+            <a:gsLst>
+              <a:gs pos="0">
+                <a:schemeClr val="accent1">
+                  <a:lumMod val="60000"/>
+                  <a:lumOff val="40000"/>
+                  <a:alpha val="0"/>
+                </a:schemeClr>
+              </a:gs>
+              <a:gs pos="85000">
+                <a:schemeClr val="accent1">
+                  <a:lumMod val="60000"/>
+                  <a:lumOff val="40000"/>
+                </a:schemeClr>
+              </a:gs>
+            </a:gsLst>
+            <a:lin ang="5400000" scaled="1"/>
+          </a:gradFill>
+          <a:ln>
+            <a:noFill/>
+          </a:ln>
+        </p:spPr>
+        <p:style>
+          <a:lnRef idx="2">
+            <a:schemeClr val="accent1">
+              <a:shade val="50000"/>
+            </a:schemeClr>
+          </a:lnRef>
+          <a:fillRef idx="1">
+            <a:schemeClr val="accent1"/>
+          </a:fillRef>
+          <a:effectRef idx="0">
+            <a:schemeClr val="accent1"/>
+          </a:effectRef>
+          <a:fontRef idx="minor">
+            <a:schemeClr val="lt1"/>
+          </a:fontRef>
+        </p:style>
+        <p:txBody>
+          <a:bodyPr wrap="square" rtlCol="0" anchor="ctr">
+            <a:noAutofit/>
+          </a:bodyPr>
+          <a:lstStyle/>
+          <a:p>
+            <a:pPr algn="ctr"/>
+            <a:endParaRPr lang="en-US"/>
+          </a:p>
+        </p:txBody>
+      </p:sp>
+      <p:sp>
+        <p:nvSpPr>
+          <p:cNvPr id="2" name="Title 1">
+            <a:extLst>
+              <a:ext uri="{FF2B5EF4-FFF2-40B4-BE49-F238E27FC236}">
+                <a16:creationId xmlns:a16="http://schemas.microsoft.com/office/drawing/2014/main" id="{51B1758B-3EFB-76F1-5394-303939B3CAB8}"/>
+              </a:ext>
+            </a:extLst>
+          </p:cNvPr>
+          <p:cNvSpPr>
+            <a:spLocks noGrp="1"/>
+          </p:cNvSpPr>
+          <p:nvPr>
+            <p:ph type="title"/>
+          </p:nvPr>
+        </p:nvSpPr>
+        <p:spPr>
+          <a:xfrm>
+            <a:off x="1290345" y="2044297"/>
+            <a:ext cx="3515311" cy="2754848"/>
+          </a:xfrm>
+        </p:spPr>
+        <p:txBody>
+          <a:bodyPr vert="horz" lIns="91440" tIns="45720" rIns="91440" bIns="45720" rtlCol="0" anchor="ctr">
+            <a:normAutofit/>
+          </a:bodyPr>
+          <a:lstStyle/>
+          <a:p>
+            <a:pPr algn="ctr"/>
+            <a:r>
+              <a:rPr lang="en-US">
+                <a:solidFill>
+                  <a:srgbClr val="000000"/>
+                </a:solidFill>
+              </a:rPr>
+              <a:t>Conclusion</a:t>
+            </a:r>
+          </a:p>
+        </p:txBody>
+      </p:sp>
+      <p:sp>
+        <p:nvSpPr>
+          <p:cNvPr id="9" name="Content Placeholder 8">
+            <a:extLst>
+              <a:ext uri="{FF2B5EF4-FFF2-40B4-BE49-F238E27FC236}">
+                <a16:creationId xmlns:a16="http://schemas.microsoft.com/office/drawing/2014/main" id="{F48DCA63-96C0-A65D-BAF6-5139F83EB89F}"/>
+              </a:ext>
+            </a:extLst>
+          </p:cNvPr>
+          <p:cNvSpPr>
+            <a:spLocks noGrp="1"/>
+          </p:cNvSpPr>
+          <p:nvPr>
+            <p:ph idx="1"/>
+          </p:nvPr>
+        </p:nvSpPr>
+        <p:spPr>
+          <a:xfrm>
+            <a:off x="6456695" y="762000"/>
+            <a:ext cx="4434565" cy="3810000"/>
+          </a:xfrm>
+        </p:spPr>
+        <p:txBody>
+          <a:bodyPr anchor="ctr">
+            <a:normAutofit/>
+          </a:bodyPr>
+          <a:lstStyle/>
+          <a:p>
+            <a:r>
+              <a:rPr lang="nl-NL" dirty="0"/>
+              <a:t>Remove half of the insect column</a:t>
+            </a:r>
+          </a:p>
+          <a:p>
+            <a:r>
+              <a:rPr lang="nl-NL" dirty="0"/>
+              <a:t>Remove all observations less then 100</a:t>
+            </a:r>
+          </a:p>
+          <a:p>
+            <a:r>
+              <a:rPr lang="nl-NL" dirty="0"/>
+              <a:t>Train on only 1 taxon group at a time</a:t>
+            </a:r>
+          </a:p>
+          <a:p>
+            <a:r>
+              <a:rPr lang="nl-NL" dirty="0"/>
+              <a:t>Get my  GPU running</a:t>
+            </a:r>
+          </a:p>
+        </p:txBody>
+      </p:sp>
+      <p:pic>
+        <p:nvPicPr>
+          <p:cNvPr id="4" name="Picture 3">
+            <a:extLst>
+              <a:ext uri="{FF2B5EF4-FFF2-40B4-BE49-F238E27FC236}">
+                <a16:creationId xmlns:a16="http://schemas.microsoft.com/office/drawing/2014/main" id="{6ED74C4E-6FC5-6CA0-ED2C-1880CA6BC87D}"/>
+              </a:ext>
+            </a:extLst>
+          </p:cNvPr>
+          <p:cNvPicPr>
+            <a:picLocks noChangeAspect="1"/>
+          </p:cNvPicPr>
+          <p:nvPr/>
+        </p:nvPicPr>
+        <p:blipFill>
+          <a:blip r:embed="rId2"/>
+          <a:stretch>
+            <a:fillRect/>
+          </a:stretch>
+        </p:blipFill>
+        <p:spPr>
+          <a:xfrm>
+            <a:off x="5578582" y="4452358"/>
+            <a:ext cx="6261494" cy="1643642"/>
+          </a:xfrm>
+          <a:prstGeom prst="rect">
+            <a:avLst/>
+          </a:prstGeom>
+        </p:spPr>
+      </p:pic>
+    </p:spTree>
+    <p:extLst>
+      <p:ext uri="{BB962C8B-B14F-4D97-AF65-F5344CB8AC3E}">
+        <p14:creationId xmlns:p14="http://schemas.microsoft.com/office/powerpoint/2010/main" val="2994859991"/>
+      </p:ext>
+    </p:extLst>
+  </p:cSld>
+  <p:clrMapOvr>
+    <a:masterClrMapping/>
+  </p:clrMapOvr>
+</p:sld>
+</file>
+
+<file path=ppt/slides/slide17.xml><?xml version="1.0" encoding="utf-8"?>
 <p:sld xmlns:a="http://schemas.openxmlformats.org/drawingml/2006/main" xmlns:r="http://schemas.openxmlformats.org/officeDocument/2006/relationships" xmlns:p="http://schemas.openxmlformats.org/presentationml/2006/main">
   <p:cSld>
     <p:bg>
@@ -31324,6 +31646,14 @@
 <file path=ppt/slides/slide6.xml><?xml version="1.0" encoding="utf-8"?>
 <p:sld xmlns:a="http://schemas.openxmlformats.org/drawingml/2006/main" xmlns:r="http://schemas.openxmlformats.org/officeDocument/2006/relationships" xmlns:p="http://schemas.openxmlformats.org/presentationml/2006/main">
   <p:cSld>
+    <p:bg>
+      <p:bgPr>
+        <a:solidFill>
+          <a:schemeClr val="bg1"/>
+        </a:solidFill>
+        <a:effectLst/>
+      </p:bgPr>
+    </p:bg>
     <p:spTree>
       <p:nvGrpSpPr>
         <p:cNvPr id="1" name=""/>
@@ -31338,6 +31668,82 @@
           <a:chExt cx="0" cy="0"/>
         </a:xfrm>
       </p:grpSpPr>
+      <p:sp useBgFill="1">
+        <p:nvSpPr>
+          <p:cNvPr id="15" name="Rectangle 9">
+            <a:extLst>
+              <a:ext uri="{FF2B5EF4-FFF2-40B4-BE49-F238E27FC236}">
+                <a16:creationId xmlns:a16="http://schemas.microsoft.com/office/drawing/2014/main" id="{3DAD064D-86F0-42ED-B520-99689857918E}"/>
+              </a:ext>
+              <a:ext uri="{C183D7F6-B498-43B3-948B-1728B52AA6E4}">
+                <adec:decorative xmlns:adec="http://schemas.microsoft.com/office/drawing/2017/decorative" val="1"/>
+              </a:ext>
+            </a:extLst>
+          </p:cNvPr>
+          <p:cNvSpPr>
+            <a:spLocks noGrp="1" noRot="1" noChangeAspect="1" noMove="1" noResize="1" noEditPoints="1" noAdjustHandles="1" noChangeArrowheads="1" noChangeShapeType="1" noTextEdit="1"/>
+          </p:cNvSpPr>
+          <p:nvPr>
+            <p:extLst>
+              <p:ext uri="{386F3935-93C4-4BCD-93E2-E3B085C9AB24}">
+                <p16:designElem xmlns:p16="http://schemas.microsoft.com/office/powerpoint/2015/main" val="1"/>
+              </p:ext>
+            </p:extLst>
+          </p:nvPr>
+        </p:nvSpPr>
+        <p:spPr>
+          <a:xfrm>
+            <a:off x="0" y="0"/>
+            <a:ext cx="12192000" cy="6858000"/>
+          </a:xfrm>
+          <a:prstGeom prst="rect">
+            <a:avLst/>
+          </a:prstGeom>
+          <a:ln w="12700" cap="flat" cmpd="sng" algn="ctr">
+            <a:noFill/>
+            <a:prstDash val="solid"/>
+            <a:miter lim="800000"/>
+          </a:ln>
+          <a:effectLst/>
+          <a:extLst>
+            <a:ext uri="{91240B29-F687-4F45-9708-019B960494DF}">
+              <a14:hiddenLine xmlns:a14="http://schemas.microsoft.com/office/drawing/2010/main" w="12700" cap="flat" cmpd="sng" algn="ctr">
+                <a:solidFill>
+                  <a:schemeClr val="accent1">
+                    <a:shade val="50000"/>
+                  </a:schemeClr>
+                </a:solidFill>
+                <a:prstDash val="solid"/>
+                <a:miter lim="800000"/>
+              </a14:hiddenLine>
+            </a:ext>
+          </a:extLst>
+        </p:spPr>
+        <p:style>
+          <a:lnRef idx="2">
+            <a:schemeClr val="accent1">
+              <a:shade val="50000"/>
+            </a:schemeClr>
+          </a:lnRef>
+          <a:fillRef idx="1">
+            <a:schemeClr val="accent1"/>
+          </a:fillRef>
+          <a:effectRef idx="0">
+            <a:schemeClr val="accent1"/>
+          </a:effectRef>
+          <a:fontRef idx="minor">
+            <a:schemeClr val="lt1"/>
+          </a:fontRef>
+        </p:style>
+        <p:txBody>
+          <a:bodyPr rtlCol="0" anchor="ctr"/>
+          <a:lstStyle/>
+          <a:p>
+            <a:pPr algn="ctr"/>
+            <a:endParaRPr lang="en-US"/>
+          </a:p>
+        </p:txBody>
+      </p:sp>
       <p:sp>
         <p:nvSpPr>
           <p:cNvPr id="2" name="Title 1">
@@ -31354,9 +31760,16 @@
             <p:ph type="title"/>
           </p:nvPr>
         </p:nvSpPr>
-        <p:spPr/>
+        <p:spPr>
+          <a:xfrm>
+            <a:off x="7031694" y="762001"/>
+            <a:ext cx="4231343" cy="1141004"/>
+          </a:xfrm>
+        </p:spPr>
         <p:txBody>
-          <a:bodyPr/>
+          <a:bodyPr>
+            <a:normAutofit/>
+          </a:bodyPr>
           <a:lstStyle/>
           <a:p>
             <a:r>
@@ -31367,6 +31780,241 @@
           </a:p>
         </p:txBody>
       </p:sp>
+      <p:sp>
+        <p:nvSpPr>
+          <p:cNvPr id="16" name="Rectangle 11">
+            <a:extLst>
+              <a:ext uri="{FF2B5EF4-FFF2-40B4-BE49-F238E27FC236}">
+                <a16:creationId xmlns:a16="http://schemas.microsoft.com/office/drawing/2014/main" id="{683DE4F2-E127-9EB5-D502-A101EED168B8}"/>
+              </a:ext>
+              <a:ext uri="{C183D7F6-B498-43B3-948B-1728B52AA6E4}">
+                <adec:decorative xmlns:adec="http://schemas.microsoft.com/office/drawing/2017/decorative" val="1"/>
+              </a:ext>
+            </a:extLst>
+          </p:cNvPr>
+          <p:cNvSpPr>
+            <a:spLocks noGrp="1" noRot="1" noChangeAspect="1" noMove="1" noResize="1" noEditPoints="1" noAdjustHandles="1" noChangeArrowheads="1" noChangeShapeType="1" noTextEdit="1"/>
+          </p:cNvSpPr>
+          <p:nvPr>
+            <p:extLst>
+              <p:ext uri="{386F3935-93C4-4BCD-93E2-E3B085C9AB24}">
+                <p16:designElem xmlns:p16="http://schemas.microsoft.com/office/powerpoint/2015/main" val="1"/>
+              </p:ext>
+            </p:extLst>
+          </p:nvPr>
+        </p:nvSpPr>
+        <p:spPr>
+          <a:xfrm>
+            <a:off x="2653" y="0"/>
+            <a:ext cx="6095999" cy="6858000"/>
+          </a:xfrm>
+          <a:prstGeom prst="rect">
+            <a:avLst/>
+          </a:prstGeom>
+          <a:gradFill>
+            <a:gsLst>
+              <a:gs pos="20000">
+                <a:schemeClr val="accent1">
+                  <a:lumMod val="60000"/>
+                  <a:lumOff val="40000"/>
+                  <a:alpha val="0"/>
+                </a:schemeClr>
+              </a:gs>
+              <a:gs pos="90000">
+                <a:schemeClr val="accent1">
+                  <a:lumMod val="60000"/>
+                  <a:lumOff val="40000"/>
+                </a:schemeClr>
+              </a:gs>
+            </a:gsLst>
+            <a:lin ang="5400000" scaled="1"/>
+          </a:gradFill>
+          <a:ln w="12700" cap="flat" cmpd="sng" algn="ctr">
+            <a:noFill/>
+            <a:prstDash val="solid"/>
+            <a:miter lim="800000"/>
+          </a:ln>
+          <a:effectLst/>
+        </p:spPr>
+        <p:style>
+          <a:lnRef idx="2">
+            <a:schemeClr val="accent1">
+              <a:shade val="50000"/>
+            </a:schemeClr>
+          </a:lnRef>
+          <a:fillRef idx="1">
+            <a:schemeClr val="accent1"/>
+          </a:fillRef>
+          <a:effectRef idx="0">
+            <a:schemeClr val="accent1"/>
+          </a:effectRef>
+          <a:fontRef idx="minor">
+            <a:schemeClr val="lt1"/>
+          </a:fontRef>
+        </p:style>
+        <p:txBody>
+          <a:bodyPr rtlCol="0" anchor="ctr"/>
+          <a:lstStyle/>
+          <a:p>
+            <a:pPr algn="ctr"/>
+            <a:endParaRPr lang="en-US"/>
+          </a:p>
+        </p:txBody>
+      </p:sp>
+      <p:sp>
+        <p:nvSpPr>
+          <p:cNvPr id="14" name="Freeform: Shape 13">
+            <a:extLst>
+              <a:ext uri="{FF2B5EF4-FFF2-40B4-BE49-F238E27FC236}">
+                <a16:creationId xmlns:a16="http://schemas.microsoft.com/office/drawing/2014/main" id="{8B4D081D-BEB0-F616-C78E-B76F0370B43D}"/>
+              </a:ext>
+              <a:ext uri="{C183D7F6-B498-43B3-948B-1728B52AA6E4}">
+                <adec:decorative xmlns:adec="http://schemas.microsoft.com/office/drawing/2017/decorative" val="1"/>
+              </a:ext>
+            </a:extLst>
+          </p:cNvPr>
+          <p:cNvSpPr>
+            <a:spLocks noGrp="1" noRot="1" noChangeAspect="1" noMove="1" noResize="1" noEditPoints="1" noAdjustHandles="1" noChangeArrowheads="1" noChangeShapeType="1" noTextEdit="1"/>
+          </p:cNvSpPr>
+          <p:nvPr>
+            <p:extLst>
+              <p:ext uri="{386F3935-93C4-4BCD-93E2-E3B085C9AB24}">
+                <p16:designElem xmlns:p16="http://schemas.microsoft.com/office/powerpoint/2015/main" val="1"/>
+              </p:ext>
+            </p:extLst>
+          </p:nvPr>
+        </p:nvSpPr>
+        <p:spPr>
+          <a:xfrm>
+            <a:off x="871994" y="1251602"/>
+            <a:ext cx="4357316" cy="4357316"/>
+          </a:xfrm>
+          <a:custGeom>
+            <a:avLst/>
+            <a:gdLst>
+              <a:gd name="connsiteX0" fmla="*/ 2178658 w 4357316"/>
+              <a:gd name="connsiteY0" fmla="*/ 0 h 4357316"/>
+              <a:gd name="connsiteX1" fmla="*/ 4357316 w 4357316"/>
+              <a:gd name="connsiteY1" fmla="*/ 2178658 h 4357316"/>
+              <a:gd name="connsiteX2" fmla="*/ 2178658 w 4357316"/>
+              <a:gd name="connsiteY2" fmla="*/ 4357316 h 4357316"/>
+              <a:gd name="connsiteX3" fmla="*/ 0 w 4357316"/>
+              <a:gd name="connsiteY3" fmla="*/ 2178658 h 4357316"/>
+              <a:gd name="connsiteX4" fmla="*/ 2178658 w 4357316"/>
+              <a:gd name="connsiteY4" fmla="*/ 0 h 4357316"/>
+            </a:gdLst>
+            <a:ahLst/>
+            <a:cxnLst>
+              <a:cxn ang="0">
+                <a:pos x="connsiteX0" y="connsiteY0"/>
+              </a:cxn>
+              <a:cxn ang="0">
+                <a:pos x="connsiteX1" y="connsiteY1"/>
+              </a:cxn>
+              <a:cxn ang="0">
+                <a:pos x="connsiteX2" y="connsiteY2"/>
+              </a:cxn>
+              <a:cxn ang="0">
+                <a:pos x="connsiteX3" y="connsiteY3"/>
+              </a:cxn>
+              <a:cxn ang="0">
+                <a:pos x="connsiteX4" y="connsiteY4"/>
+              </a:cxn>
+            </a:cxnLst>
+            <a:rect l="l" t="t" r="r" b="b"/>
+            <a:pathLst>
+              <a:path w="4357316" h="4357316">
+                <a:moveTo>
+                  <a:pt x="2178658" y="0"/>
+                </a:moveTo>
+                <a:cubicBezTo>
+                  <a:pt x="3381898" y="0"/>
+                  <a:pt x="4357316" y="975418"/>
+                  <a:pt x="4357316" y="2178658"/>
+                </a:cubicBezTo>
+                <a:cubicBezTo>
+                  <a:pt x="4357316" y="3381898"/>
+                  <a:pt x="3381898" y="4357316"/>
+                  <a:pt x="2178658" y="4357316"/>
+                </a:cubicBezTo>
+                <a:cubicBezTo>
+                  <a:pt x="975418" y="4357316"/>
+                  <a:pt x="0" y="3381898"/>
+                  <a:pt x="0" y="2178658"/>
+                </a:cubicBezTo>
+                <a:cubicBezTo>
+                  <a:pt x="0" y="975418"/>
+                  <a:pt x="975418" y="0"/>
+                  <a:pt x="2178658" y="0"/>
+                </a:cubicBezTo>
+                <a:close/>
+              </a:path>
+            </a:pathLst>
+          </a:custGeom>
+          <a:solidFill>
+            <a:srgbClr val="FFFFFF"/>
+          </a:solidFill>
+          <a:ln>
+            <a:noFill/>
+          </a:ln>
+        </p:spPr>
+        <p:style>
+          <a:lnRef idx="2">
+            <a:schemeClr val="accent1">
+              <a:shade val="50000"/>
+            </a:schemeClr>
+          </a:lnRef>
+          <a:fillRef idx="1">
+            <a:schemeClr val="accent1"/>
+          </a:fillRef>
+          <a:effectRef idx="0">
+            <a:schemeClr val="accent1"/>
+          </a:effectRef>
+          <a:fontRef idx="minor">
+            <a:schemeClr val="lt1"/>
+          </a:fontRef>
+        </p:style>
+        <p:txBody>
+          <a:bodyPr wrap="square" rtlCol="0" anchor="ctr">
+            <a:noAutofit/>
+          </a:bodyPr>
+          <a:lstStyle/>
+          <a:p>
+            <a:pPr algn="ctr"/>
+            <a:endParaRPr lang="en-US"/>
+          </a:p>
+        </p:txBody>
+      </p:sp>
+      <p:pic>
+        <p:nvPicPr>
+          <p:cNvPr id="5" name="Picture 4">
+            <a:extLst>
+              <a:ext uri="{FF2B5EF4-FFF2-40B4-BE49-F238E27FC236}">
+                <a16:creationId xmlns:a16="http://schemas.microsoft.com/office/drawing/2014/main" id="{0406F0D0-94E1-4954-A5BE-1170BA1A255F}"/>
+              </a:ext>
+            </a:extLst>
+          </p:cNvPr>
+          <p:cNvPicPr>
+            <a:picLocks noChangeAspect="1"/>
+          </p:cNvPicPr>
+          <p:nvPr/>
+        </p:nvPicPr>
+        <p:blipFill>
+          <a:blip r:embed="rId2"/>
+          <a:stretch>
+            <a:fillRect/>
+          </a:stretch>
+        </p:blipFill>
+        <p:spPr>
+          <a:xfrm>
+            <a:off x="1659898" y="2516056"/>
+            <a:ext cx="2766497" cy="1825887"/>
+          </a:xfrm>
+          <a:prstGeom prst="rect">
+            <a:avLst/>
+          </a:prstGeom>
+        </p:spPr>
+      </p:pic>
       <p:sp>
         <p:nvSpPr>
           <p:cNvPr id="3" name="Content Placeholder 2">
@@ -31383,34 +32031,40 @@
             <p:ph idx="1"/>
           </p:nvPr>
         </p:nvSpPr>
-        <p:spPr/>
+        <p:spPr>
+          <a:xfrm>
+            <a:off x="7033937" y="2291542"/>
+            <a:ext cx="4219148" cy="3810000"/>
+          </a:xfrm>
+        </p:spPr>
         <p:txBody>
-          <a:bodyPr/>
+          <a:bodyPr>
+            <a:normAutofit/>
+          </a:bodyPr>
           <a:lstStyle/>
           <a:p>
             <a:r>
-              <a:rPr lang="nl-NL"/>
+              <a:rPr lang="nl-NL" dirty="0"/>
               <a:t>Checked and filled in empty values in this dataset</a:t>
             </a:r>
           </a:p>
           <a:p>
             <a:r>
-              <a:rPr lang="nl-NL"/>
+              <a:rPr lang="nl-NL" dirty="0"/>
               <a:t>Removed duplicated rows</a:t>
             </a:r>
           </a:p>
           <a:p>
             <a:r>
-              <a:rPr lang="nl-NL"/>
+              <a:rPr lang="nl-NL" dirty="0"/>
               <a:t>Changed dutch names into english names</a:t>
             </a:r>
           </a:p>
           <a:p>
             <a:r>
-              <a:rPr lang="nl-NL"/>
+              <a:rPr lang="nl-NL" dirty="0"/>
               <a:t>Adding new columns wheter the species is dangerous and why it is dangerous</a:t>
             </a:r>
-            <a:endParaRPr lang="nl-NL" dirty="0"/>
           </a:p>
         </p:txBody>
       </p:sp>

</xml_diff>